<commit_message>
Updated PTD from Visual Features/Link Analysis
An updated copy of my primary technical documentation.
</commit_message>
<xml_diff>
--- a/NRummel_PTD.pptx
+++ b/NRummel_PTD.pptx
@@ -3638,7 +3638,7 @@
           <a:p>
             <a:fld id="{364F27C5-3769-434D-A2E4-2BB3689473B7}" type="datetimeFigureOut">
               <a:rPr lang="en-US" smtClean="0"/>
-              <a:t>9/20/2018</a:t>
+              <a:t>10/15/2018</a:t>
             </a:fld>
             <a:endParaRPr lang="en-US"/>
           </a:p>
@@ -4288,7 +4288,7 @@
           <a:p>
             <a:fld id="{2E7336D6-1489-4664-B89A-7973545B731C}" type="datetimeFigureOut">
               <a:rPr lang="en-US" smtClean="0"/>
-              <a:t>9/20/2018</a:t>
+              <a:t>10/15/2018</a:t>
             </a:fld>
             <a:endParaRPr lang="en-US"/>
           </a:p>
@@ -4458,7 +4458,7 @@
           <a:p>
             <a:fld id="{2E7336D6-1489-4664-B89A-7973545B731C}" type="datetimeFigureOut">
               <a:rPr lang="en-US" smtClean="0"/>
-              <a:t>9/20/2018</a:t>
+              <a:t>10/15/2018</a:t>
             </a:fld>
             <a:endParaRPr lang="en-US"/>
           </a:p>
@@ -4638,7 +4638,7 @@
           <a:p>
             <a:fld id="{2E7336D6-1489-4664-B89A-7973545B731C}" type="datetimeFigureOut">
               <a:rPr lang="en-US" smtClean="0"/>
-              <a:t>9/20/2018</a:t>
+              <a:t>10/15/2018</a:t>
             </a:fld>
             <a:endParaRPr lang="en-US"/>
           </a:p>
@@ -4808,7 +4808,7 @@
           <a:p>
             <a:fld id="{2E7336D6-1489-4664-B89A-7973545B731C}" type="datetimeFigureOut">
               <a:rPr lang="en-US" smtClean="0"/>
-              <a:t>9/20/2018</a:t>
+              <a:t>10/15/2018</a:t>
             </a:fld>
             <a:endParaRPr lang="en-US"/>
           </a:p>
@@ -5054,7 +5054,7 @@
           <a:p>
             <a:fld id="{2E7336D6-1489-4664-B89A-7973545B731C}" type="datetimeFigureOut">
               <a:rPr lang="en-US" smtClean="0"/>
-              <a:t>9/20/2018</a:t>
+              <a:t>10/15/2018</a:t>
             </a:fld>
             <a:endParaRPr lang="en-US"/>
           </a:p>
@@ -5286,7 +5286,7 @@
           <a:p>
             <a:fld id="{2E7336D6-1489-4664-B89A-7973545B731C}" type="datetimeFigureOut">
               <a:rPr lang="en-US" smtClean="0"/>
-              <a:t>9/20/2018</a:t>
+              <a:t>10/15/2018</a:t>
             </a:fld>
             <a:endParaRPr lang="en-US"/>
           </a:p>
@@ -5653,7 +5653,7 @@
           <a:p>
             <a:fld id="{2E7336D6-1489-4664-B89A-7973545B731C}" type="datetimeFigureOut">
               <a:rPr lang="en-US" smtClean="0"/>
-              <a:t>9/20/2018</a:t>
+              <a:t>10/15/2018</a:t>
             </a:fld>
             <a:endParaRPr lang="en-US"/>
           </a:p>
@@ -5771,7 +5771,7 @@
           <a:p>
             <a:fld id="{2E7336D6-1489-4664-B89A-7973545B731C}" type="datetimeFigureOut">
               <a:rPr lang="en-US" smtClean="0"/>
-              <a:t>9/20/2018</a:t>
+              <a:t>10/15/2018</a:t>
             </a:fld>
             <a:endParaRPr lang="en-US"/>
           </a:p>
@@ -5866,7 +5866,7 @@
           <a:p>
             <a:fld id="{2E7336D6-1489-4664-B89A-7973545B731C}" type="datetimeFigureOut">
               <a:rPr lang="en-US" smtClean="0"/>
-              <a:t>9/20/2018</a:t>
+              <a:t>10/15/2018</a:t>
             </a:fld>
             <a:endParaRPr lang="en-US"/>
           </a:p>
@@ -6143,7 +6143,7 @@
           <a:p>
             <a:fld id="{2E7336D6-1489-4664-B89A-7973545B731C}" type="datetimeFigureOut">
               <a:rPr lang="en-US" smtClean="0"/>
-              <a:t>9/20/2018</a:t>
+              <a:t>10/15/2018</a:t>
             </a:fld>
             <a:endParaRPr lang="en-US"/>
           </a:p>
@@ -6400,7 +6400,7 @@
           <a:p>
             <a:fld id="{2E7336D6-1489-4664-B89A-7973545B731C}" type="datetimeFigureOut">
               <a:rPr lang="en-US" smtClean="0"/>
-              <a:t>9/20/2018</a:t>
+              <a:t>10/15/2018</a:t>
             </a:fld>
             <a:endParaRPr lang="en-US"/>
           </a:p>
@@ -6613,7 +6613,7 @@
           <a:p>
             <a:fld id="{2E7336D6-1489-4664-B89A-7973545B731C}" type="datetimeFigureOut">
               <a:rPr lang="en-US" smtClean="0"/>
-              <a:t>9/20/2018</a:t>
+              <a:t>10/15/2018</a:t>
             </a:fld>
             <a:endParaRPr lang="en-US"/>
           </a:p>
@@ -13138,25 +13138,32 @@
             <p:ph idx="1"/>
           </p:nvPr>
         </p:nvSpPr>
-        <p:spPr/>
-        <p:txBody>
-          <a:bodyPr/>
+        <p:spPr>
+          <a:xfrm>
+            <a:off x="838200" y="1825625"/>
+            <a:ext cx="10515600" cy="4848020"/>
+          </a:xfrm>
+        </p:spPr>
+        <p:txBody>
+          <a:bodyPr>
+            <a:normAutofit/>
+          </a:bodyPr>
           <a:lstStyle/>
           <a:p>
             <a:r>
-              <a:rPr lang="en-US" dirty="0"/>
+              <a:rPr lang="en-US" strike="sngStrike" dirty="0"/>
               <a:t>Link has an ID number</a:t>
             </a:r>
           </a:p>
           <a:p>
             <a:r>
-              <a:rPr lang="en-US" dirty="0"/>
+              <a:rPr lang="en-US" strike="sngStrike" dirty="0"/>
               <a:t>Link has a date</a:t>
             </a:r>
           </a:p>
           <a:p>
             <a:r>
-              <a:rPr lang="en-US" dirty="0"/>
+              <a:rPr lang="en-US" strike="sngStrike" dirty="0"/>
               <a:t>Link has a longer link length (contains title)</a:t>
             </a:r>
           </a:p>
@@ -13168,14 +13175,23 @@
           </a:p>
           <a:p>
             <a:r>
-              <a:rPr lang="en-US" dirty="0"/>
+              <a:rPr lang="en-US" strike="sngStrike" dirty="0"/>
               <a:t>Link does not have a reserved word (video, slideshow, etc.)</a:t>
             </a:r>
           </a:p>
           <a:p>
             <a:r>
-              <a:rPr lang="en-US" dirty="0"/>
+              <a:rPr lang="en-US" strike="sngStrike" dirty="0"/>
               <a:t>Link does not have a slash at the end</a:t>
+            </a:r>
+          </a:p>
+          <a:p>
+            <a:endParaRPr lang="en-US" dirty="0"/>
+          </a:p>
+          <a:p>
+            <a:r>
+              <a:rPr lang="en-US" dirty="0"/>
+              <a:t>As of 9/23/2018, link analysis rules and tests have been programmed and committed to GitHub repo.</a:t>
             </a:r>
           </a:p>
         </p:txBody>

</xml_diff>